<commit_message>
erweiterung eda und pptx
</commit_message>
<xml_diff>
--- a/Presentations/session2.pptx
+++ b/Presentations/session2.pptx
@@ -5,14 +5,15 @@
     <p:sldMasterId id="2147483648" r:id="rId1"/>
   </p:sldMasterIdLst>
   <p:notesMasterIdLst>
-    <p:notesMasterId r:id="rId7"/>
+    <p:notesMasterId r:id="rId8"/>
   </p:notesMasterIdLst>
   <p:sldIdLst>
     <p:sldId id="256" r:id="rId2"/>
     <p:sldId id="257" r:id="rId3"/>
     <p:sldId id="258" r:id="rId4"/>
-    <p:sldId id="259" r:id="rId5"/>
-    <p:sldId id="260" r:id="rId6"/>
+    <p:sldId id="261" r:id="rId5"/>
+    <p:sldId id="259" r:id="rId6"/>
+    <p:sldId id="260" r:id="rId7"/>
   </p:sldIdLst>
   <p:sldSz cx="12192000" cy="6858000"/>
   <p:notesSz cx="6858000" cy="9144000"/>
@@ -3477,13 +3478,13 @@
           <a:p>
             <a:r>
               <a:rPr lang="en-GB" dirty="0"/>
-              <a:t>Metadata: run time, revenue, genres, …</a:t>
+              <a:t>Metadata: run time, revenue, genres, etc.</a:t>
             </a:r>
           </a:p>
           <a:p>
             <a:r>
               <a:rPr lang="en-GB" dirty="0"/>
-              <a:t>Character metadata: name, actor, …</a:t>
+              <a:t>Character metadata: name, actor, etc.</a:t>
             </a:r>
           </a:p>
         </p:txBody>
@@ -3595,12 +3596,158 @@
             <p:ph idx="1"/>
           </p:nvPr>
         </p:nvSpPr>
-        <p:spPr/>
-        <p:txBody>
-          <a:bodyPr/>
-          <a:lstStyle/>
-          <a:p>
-            <a:endParaRPr lang="de-AT"/>
+        <p:spPr>
+          <a:xfrm>
+            <a:off x="838200" y="1825625"/>
+            <a:ext cx="10515600" cy="3403323"/>
+          </a:xfrm>
+        </p:spPr>
+        <p:txBody>
+          <a:bodyPr anchor="ctr">
+            <a:normAutofit/>
+          </a:bodyPr>
+          <a:lstStyle/>
+          <a:p>
+            <a:pPr marL="0" indent="0" algn="ctr">
+              <a:buNone/>
+            </a:pPr>
+            <a:r>
+              <a:rPr lang="de-DE" sz="3200" dirty="0" err="1"/>
+              <a:t>Using</a:t>
+            </a:r>
+            <a:r>
+              <a:rPr lang="de-DE" sz="3200" dirty="0"/>
+              <a:t> NLP </a:t>
+            </a:r>
+            <a:r>
+              <a:rPr lang="de-DE" sz="3200" dirty="0" err="1"/>
+              <a:t>techniques</a:t>
+            </a:r>
+            <a:r>
+              <a:rPr lang="de-DE" sz="3200" dirty="0"/>
+              <a:t>, </a:t>
+            </a:r>
+            <a:r>
+              <a:rPr lang="de-DE" sz="3200" dirty="0" err="1"/>
+              <a:t>how</a:t>
+            </a:r>
+            <a:r>
+              <a:rPr lang="de-DE" sz="3200" dirty="0"/>
+              <a:t> </a:t>
+            </a:r>
+            <a:r>
+              <a:rPr lang="de-DE" sz="3200" dirty="0" err="1"/>
+              <a:t>can</a:t>
+            </a:r>
+            <a:r>
+              <a:rPr lang="de-DE" sz="3200" dirty="0"/>
+              <a:t> </a:t>
+            </a:r>
+            <a:r>
+              <a:rPr lang="de-DE" sz="3200" dirty="0" err="1"/>
+              <a:t>movies</a:t>
+            </a:r>
+            <a:r>
+              <a:rPr lang="de-DE" sz="3200" dirty="0"/>
+              <a:t> </a:t>
+            </a:r>
+            <a:r>
+              <a:rPr lang="de-DE" sz="3200" dirty="0" err="1"/>
+              <a:t>be</a:t>
+            </a:r>
+            <a:r>
+              <a:rPr lang="de-DE" sz="3200" dirty="0"/>
+              <a:t> </a:t>
+            </a:r>
+            <a:r>
+              <a:rPr lang="de-DE" sz="3200" dirty="0" err="1"/>
+              <a:t>assigned</a:t>
+            </a:r>
+            <a:r>
+              <a:rPr lang="de-DE" sz="3200" dirty="0"/>
+              <a:t> </a:t>
+            </a:r>
+            <a:r>
+              <a:rPr lang="de-DE" sz="3200" dirty="0" err="1"/>
+              <a:t>to</a:t>
+            </a:r>
+            <a:r>
+              <a:rPr lang="de-DE" sz="3200" dirty="0"/>
+              <a:t> </a:t>
+            </a:r>
+            <a:r>
+              <a:rPr lang="de-DE" sz="3200" dirty="0" err="1"/>
+              <a:t>their</a:t>
+            </a:r>
+            <a:r>
+              <a:rPr lang="de-DE" sz="3200" dirty="0"/>
+              <a:t> </a:t>
+            </a:r>
+            <a:r>
+              <a:rPr lang="de-DE" sz="3200" dirty="0" err="1"/>
+              <a:t>genre</a:t>
+            </a:r>
+            <a:r>
+              <a:rPr lang="de-DE" sz="3200" dirty="0"/>
+              <a:t> </a:t>
+            </a:r>
+            <a:r>
+              <a:rPr lang="de-DE" sz="3200" dirty="0" err="1"/>
+              <a:t>based</a:t>
+            </a:r>
+            <a:r>
+              <a:rPr lang="de-DE" sz="3200" dirty="0"/>
+              <a:t> on a </a:t>
+            </a:r>
+            <a:r>
+              <a:rPr lang="de-DE" sz="3200" dirty="0" err="1"/>
+              <a:t>short</a:t>
+            </a:r>
+            <a:r>
+              <a:rPr lang="de-DE" sz="3200" dirty="0"/>
+              <a:t> </a:t>
+            </a:r>
+            <a:r>
+              <a:rPr lang="de-DE" sz="3200" dirty="0" err="1"/>
+              <a:t>summary</a:t>
+            </a:r>
+            <a:r>
+              <a:rPr lang="de-DE" sz="3200" dirty="0"/>
+              <a:t> </a:t>
+            </a:r>
+            <a:r>
+              <a:rPr lang="de-DE" sz="3200" dirty="0" err="1"/>
+              <a:t>of</a:t>
+            </a:r>
+            <a:r>
+              <a:rPr lang="de-DE" sz="3200" dirty="0"/>
+              <a:t> </a:t>
+            </a:r>
+            <a:r>
+              <a:rPr lang="de-DE" sz="3200" dirty="0" err="1"/>
+              <a:t>the</a:t>
+            </a:r>
+            <a:r>
+              <a:rPr lang="de-DE" sz="3200" dirty="0"/>
+              <a:t> </a:t>
+            </a:r>
+            <a:r>
+              <a:rPr lang="de-DE" sz="3200" dirty="0" err="1"/>
+              <a:t>movies</a:t>
+            </a:r>
+            <a:r>
+              <a:rPr lang="de-DE" sz="3200" dirty="0"/>
+              <a:t> </a:t>
+            </a:r>
+            <a:r>
+              <a:rPr lang="de-DE" sz="3200" dirty="0" err="1"/>
+              <a:t>plot</a:t>
+            </a:r>
+            <a:r>
+              <a:rPr lang="de-DE" sz="3200" dirty="0"/>
+              <a:t>?</a:t>
+            </a:r>
+            <a:endParaRPr lang="de-AT" sz="3200" dirty="0"/>
           </a:p>
         </p:txBody>
       </p:sp>
@@ -3639,6 +3786,147 @@
           <p:cNvPr id="2" name="Titel 1">
             <a:extLst>
               <a:ext uri="{FF2B5EF4-FFF2-40B4-BE49-F238E27FC236}">
+                <a16:creationId xmlns:a16="http://schemas.microsoft.com/office/drawing/2014/main" id="{2910205A-CFE6-4B94-36AF-72B786DF6741}"/>
+              </a:ext>
+            </a:extLst>
+          </p:cNvPr>
+          <p:cNvSpPr>
+            <a:spLocks noGrp="1"/>
+          </p:cNvSpPr>
+          <p:nvPr>
+            <p:ph type="title"/>
+          </p:nvPr>
+        </p:nvSpPr>
+        <p:spPr/>
+        <p:txBody>
+          <a:bodyPr/>
+          <a:lstStyle/>
+          <a:p>
+            <a:r>
+              <a:rPr lang="de-DE" dirty="0" err="1"/>
+              <a:t>Preprocessing</a:t>
+            </a:r>
+            <a:r>
+              <a:rPr lang="de-DE" dirty="0"/>
+              <a:t> </a:t>
+            </a:r>
+            <a:r>
+              <a:rPr lang="de-DE" dirty="0" err="1"/>
+              <a:t>steps</a:t>
+            </a:r>
+            <a:endParaRPr lang="de-AT" dirty="0"/>
+          </a:p>
+        </p:txBody>
+      </p:sp>
+      <p:sp>
+        <p:nvSpPr>
+          <p:cNvPr id="3" name="Inhaltsplatzhalter 2">
+            <a:extLst>
+              <a:ext uri="{FF2B5EF4-FFF2-40B4-BE49-F238E27FC236}">
+                <a16:creationId xmlns:a16="http://schemas.microsoft.com/office/drawing/2014/main" id="{F743A739-591F-98C3-6180-E4EC0BC4E20A}"/>
+              </a:ext>
+            </a:extLst>
+          </p:cNvPr>
+          <p:cNvSpPr>
+            <a:spLocks noGrp="1"/>
+          </p:cNvSpPr>
+          <p:nvPr>
+            <p:ph idx="1"/>
+          </p:nvPr>
+        </p:nvSpPr>
+        <p:spPr/>
+        <p:txBody>
+          <a:bodyPr/>
+          <a:lstStyle/>
+          <a:p>
+            <a:r>
+              <a:rPr lang="de-DE" dirty="0"/>
+              <a:t>Transfer </a:t>
+            </a:r>
+            <a:r>
+              <a:rPr lang="de-DE" dirty="0" err="1"/>
+              <a:t>to</a:t>
+            </a:r>
+            <a:r>
+              <a:rPr lang="de-DE" dirty="0"/>
+              <a:t> </a:t>
+            </a:r>
+            <a:r>
+              <a:rPr lang="de-DE" dirty="0" err="1"/>
+              <a:t>lowercase</a:t>
+            </a:r>
+            <a:endParaRPr lang="de-DE" dirty="0"/>
+          </a:p>
+          <a:p>
+            <a:r>
+              <a:rPr lang="de-DE" dirty="0"/>
+              <a:t>Remove </a:t>
+            </a:r>
+            <a:r>
+              <a:rPr lang="de-DE" dirty="0" err="1"/>
+              <a:t>numbers</a:t>
+            </a:r>
+            <a:endParaRPr lang="de-DE" dirty="0"/>
+          </a:p>
+          <a:p>
+            <a:r>
+              <a:rPr lang="de-AT" dirty="0" err="1"/>
+              <a:t>Lemmatization</a:t>
+            </a:r>
+            <a:endParaRPr lang="de-AT" dirty="0"/>
+          </a:p>
+          <a:p>
+            <a:r>
+              <a:rPr lang="de-AT" dirty="0" err="1"/>
+              <a:t>Document</a:t>
+            </a:r>
+            <a:r>
+              <a:rPr lang="de-AT" dirty="0"/>
+              <a:t> Term </a:t>
+            </a:r>
+            <a:r>
+              <a:rPr lang="de-AT" dirty="0" err="1"/>
+              <a:t>matrix</a:t>
+            </a:r>
+            <a:endParaRPr lang="de-AT" dirty="0"/>
+          </a:p>
+        </p:txBody>
+      </p:sp>
+    </p:spTree>
+    <p:extLst>
+      <p:ext uri="{BB962C8B-B14F-4D97-AF65-F5344CB8AC3E}">
+        <p14:creationId xmlns:p14="http://schemas.microsoft.com/office/powerpoint/2010/main" val="220015039"/>
+      </p:ext>
+    </p:extLst>
+  </p:cSld>
+  <p:clrMapOvr>
+    <a:masterClrMapping/>
+  </p:clrMapOvr>
+</p:sld>
+</file>
+
+<file path=ppt/slides/slide5.xml><?xml version="1.0" encoding="utf-8"?>
+<p:sld xmlns:a="http://schemas.openxmlformats.org/drawingml/2006/main" xmlns:r="http://schemas.openxmlformats.org/officeDocument/2006/relationships" xmlns:p="http://schemas.openxmlformats.org/presentationml/2006/main">
+  <p:cSld>
+    <p:spTree>
+      <p:nvGrpSpPr>
+        <p:cNvPr id="1" name=""/>
+        <p:cNvGrpSpPr/>
+        <p:nvPr/>
+      </p:nvGrpSpPr>
+      <p:grpSpPr>
+        <a:xfrm>
+          <a:off x="0" y="0"/>
+          <a:ext cx="0" cy="0"/>
+          <a:chOff x="0" y="0"/>
+          <a:chExt cx="0" cy="0"/>
+        </a:xfrm>
+      </p:grpSpPr>
+      <p:sp>
+        <p:nvSpPr>
+          <p:cNvPr id="2" name="Titel 1">
+            <a:extLst>
+              <a:ext uri="{FF2B5EF4-FFF2-40B4-BE49-F238E27FC236}">
                 <a16:creationId xmlns:a16="http://schemas.microsoft.com/office/drawing/2014/main" id="{900B694A-F691-4376-DC6E-ACDEE261174C}"/>
               </a:ext>
             </a:extLst>
@@ -3683,62 +3971,6 @@
         <p:txBody>
           <a:bodyPr/>
           <a:lstStyle/>
-          <a:p>
-            <a:pPr marL="0" indent="0">
-              <a:buNone/>
-            </a:pPr>
-            <a:r>
-              <a:rPr lang="de-DE" dirty="0" err="1"/>
-              <a:t>Preprocessing</a:t>
-            </a:r>
-            <a:r>
-              <a:rPr lang="de-DE" dirty="0"/>
-              <a:t>: </a:t>
-            </a:r>
-          </a:p>
-          <a:p>
-            <a:r>
-              <a:rPr lang="de-DE" dirty="0" err="1"/>
-              <a:t>lowercase</a:t>
-            </a:r>
-            <a:r>
-              <a:rPr lang="de-DE" dirty="0"/>
-              <a:t>, </a:t>
-            </a:r>
-            <a:r>
-              <a:rPr lang="de-DE" dirty="0" err="1"/>
-              <a:t>remove</a:t>
-            </a:r>
-            <a:r>
-              <a:rPr lang="de-DE" dirty="0"/>
-              <a:t> </a:t>
-            </a:r>
-            <a:r>
-              <a:rPr lang="de-DE" dirty="0" err="1"/>
-              <a:t>numbers</a:t>
-            </a:r>
-            <a:r>
-              <a:rPr lang="de-DE" dirty="0"/>
-              <a:t>, … </a:t>
-            </a:r>
-          </a:p>
-          <a:p>
-            <a:r>
-              <a:rPr lang="de-DE" dirty="0" err="1"/>
-              <a:t>Lemmatization</a:t>
-            </a:r>
-            <a:endParaRPr lang="de-DE" dirty="0"/>
-          </a:p>
-          <a:p>
-            <a:r>
-              <a:rPr lang="de-DE" dirty="0" err="1"/>
-              <a:t>Document</a:t>
-            </a:r>
-            <a:r>
-              <a:rPr lang="de-DE" dirty="0"/>
-              <a:t> Term Matrix</a:t>
-            </a:r>
-          </a:p>
           <a:p>
             <a:endParaRPr lang="de-AT" dirty="0"/>
           </a:p>
@@ -3757,7 +3989,7 @@
 </p:sld>
 </file>
 
-<file path=ppt/slides/slide5.xml><?xml version="1.0" encoding="utf-8"?>
+<file path=ppt/slides/slide6.xml><?xml version="1.0" encoding="utf-8"?>
 <p:sld xmlns:a="http://schemas.openxmlformats.org/drawingml/2006/main" xmlns:r="http://schemas.openxmlformats.org/officeDocument/2006/relationships" xmlns:p="http://schemas.openxmlformats.org/presentationml/2006/main">
   <p:cSld>
     <p:spTree>

</xml_diff>

<commit_message>
Update EDA and pptx
</commit_message>
<xml_diff>
--- a/Presentations/session2.pptx
+++ b/Presentations/session2.pptx
@@ -5,15 +5,16 @@
     <p:sldMasterId id="2147483648" r:id="rId1"/>
   </p:sldMasterIdLst>
   <p:notesMasterIdLst>
-    <p:notesMasterId r:id="rId8"/>
+    <p:notesMasterId r:id="rId9"/>
   </p:notesMasterIdLst>
   <p:sldIdLst>
     <p:sldId id="256" r:id="rId2"/>
     <p:sldId id="257" r:id="rId3"/>
     <p:sldId id="258" r:id="rId4"/>
     <p:sldId id="261" r:id="rId5"/>
-    <p:sldId id="259" r:id="rId6"/>
-    <p:sldId id="260" r:id="rId7"/>
+    <p:sldId id="260" r:id="rId6"/>
+    <p:sldId id="262" r:id="rId7"/>
+    <p:sldId id="263" r:id="rId8"/>
   </p:sldIdLst>
   <p:sldSz cx="12192000" cy="6858000"/>
   <p:notesSz cx="6858000" cy="9144000"/>
@@ -3478,13 +3479,13 @@
           <a:p>
             <a:r>
               <a:rPr lang="en-GB" dirty="0"/>
-              <a:t>Metadata: run time, revenue, genres, etc.</a:t>
+              <a:t>Metadata: genres, run time, revenue, etc.</a:t>
             </a:r>
           </a:p>
           <a:p>
             <a:r>
               <a:rPr lang="en-GB" dirty="0"/>
-              <a:t>Character metadata: name, actor, etc.</a:t>
+              <a:t>Character metadata: name, actors, etc.</a:t>
             </a:r>
           </a:p>
         </p:txBody>
@@ -3927,7 +3928,7 @@
           <p:cNvPr id="2" name="Titel 1">
             <a:extLst>
               <a:ext uri="{FF2B5EF4-FFF2-40B4-BE49-F238E27FC236}">
-                <a16:creationId xmlns:a16="http://schemas.microsoft.com/office/drawing/2014/main" id="{900B694A-F691-4376-DC6E-ACDEE261174C}"/>
+                <a16:creationId xmlns:a16="http://schemas.microsoft.com/office/drawing/2014/main" id="{CCEFC05D-7A29-2D39-BE77-28AF623C642E}"/>
               </a:ext>
             </a:extLst>
           </p:cNvPr>
@@ -3945,41 +3946,52 @@
           <a:p>
             <a:r>
               <a:rPr lang="de-DE" dirty="0"/>
-              <a:t>EDA</a:t>
+              <a:t>EDA - </a:t>
+            </a:r>
+            <a:r>
+              <a:rPr lang="de-DE" dirty="0" err="1"/>
+              <a:t>wordcloud</a:t>
             </a:r>
             <a:endParaRPr lang="de-AT" dirty="0"/>
           </a:p>
         </p:txBody>
       </p:sp>
-      <p:sp>
-        <p:nvSpPr>
-          <p:cNvPr id="3" name="Inhaltsplatzhalter 2">
+      <p:pic>
+        <p:nvPicPr>
+          <p:cNvPr id="4" name="Inhaltsplatzhalter 3">
             <a:extLst>
               <a:ext uri="{FF2B5EF4-FFF2-40B4-BE49-F238E27FC236}">
-                <a16:creationId xmlns:a16="http://schemas.microsoft.com/office/drawing/2014/main" id="{519AEF5B-CFE4-9AA8-4A83-742E608F570B}"/>
+                <a16:creationId xmlns:a16="http://schemas.microsoft.com/office/drawing/2014/main" id="{6E679D16-457A-984C-4792-1A06F69CD991}"/>
               </a:ext>
             </a:extLst>
           </p:cNvPr>
-          <p:cNvSpPr>
-            <a:spLocks noGrp="1"/>
-          </p:cNvSpPr>
+          <p:cNvPicPr>
+            <a:picLocks noGrp="1" noChangeAspect="1"/>
+          </p:cNvPicPr>
           <p:nvPr>
             <p:ph idx="1"/>
           </p:nvPr>
-        </p:nvSpPr>
-        <p:spPr/>
-        <p:txBody>
-          <a:bodyPr/>
-          <a:lstStyle/>
-          <a:p>
-            <a:endParaRPr lang="de-AT" dirty="0"/>
-          </a:p>
-        </p:txBody>
-      </p:sp>
+        </p:nvPicPr>
+        <p:blipFill>
+          <a:blip r:embed="rId2"/>
+          <a:stretch>
+            <a:fillRect/>
+          </a:stretch>
+        </p:blipFill>
+        <p:spPr>
+          <a:xfrm>
+            <a:off x="3454624" y="1558925"/>
+            <a:ext cx="5282751" cy="4351338"/>
+          </a:xfrm>
+          <a:prstGeom prst="rect">
+            <a:avLst/>
+          </a:prstGeom>
+        </p:spPr>
+      </p:pic>
     </p:spTree>
     <p:extLst>
       <p:ext uri="{BB962C8B-B14F-4D97-AF65-F5344CB8AC3E}">
-        <p14:creationId xmlns:p14="http://schemas.microsoft.com/office/powerpoint/2010/main" val="1818742757"/>
+        <p14:creationId xmlns:p14="http://schemas.microsoft.com/office/powerpoint/2010/main" val="3261292717"/>
       </p:ext>
     </p:extLst>
   </p:cSld>
@@ -4006,45 +4018,12 @@
           <a:chExt cx="0" cy="0"/>
         </a:xfrm>
       </p:grpSpPr>
-      <p:sp>
-        <p:nvSpPr>
-          <p:cNvPr id="2" name="Titel 1">
+      <p:pic>
+        <p:nvPicPr>
+          <p:cNvPr id="7" name="Inhaltsplatzhalter 6">
             <a:extLst>
               <a:ext uri="{FF2B5EF4-FFF2-40B4-BE49-F238E27FC236}">
-                <a16:creationId xmlns:a16="http://schemas.microsoft.com/office/drawing/2014/main" id="{CCEFC05D-7A29-2D39-BE77-28AF623C642E}"/>
-              </a:ext>
-            </a:extLst>
-          </p:cNvPr>
-          <p:cNvSpPr>
-            <a:spLocks noGrp="1"/>
-          </p:cNvSpPr>
-          <p:nvPr>
-            <p:ph type="title"/>
-          </p:nvPr>
-        </p:nvSpPr>
-        <p:spPr/>
-        <p:txBody>
-          <a:bodyPr/>
-          <a:lstStyle/>
-          <a:p>
-            <a:r>
-              <a:rPr lang="de-DE" dirty="0"/>
-              <a:t>EDA </a:t>
-            </a:r>
-            <a:r>
-              <a:rPr lang="de-DE" dirty="0" err="1"/>
-              <a:t>cont‘d</a:t>
-            </a:r>
-            <a:endParaRPr lang="de-AT" dirty="0"/>
-          </a:p>
-        </p:txBody>
-      </p:sp>
-      <p:pic>
-        <p:nvPicPr>
-          <p:cNvPr id="4" name="Inhaltsplatzhalter 3">
-            <a:extLst>
-              <a:ext uri="{FF2B5EF4-FFF2-40B4-BE49-F238E27FC236}">
-                <a16:creationId xmlns:a16="http://schemas.microsoft.com/office/drawing/2014/main" id="{6E679D16-457A-984C-4792-1A06F69CD991}"/>
+                <a16:creationId xmlns:a16="http://schemas.microsoft.com/office/drawing/2014/main" id="{4BF365BB-A614-182A-6EBE-22A84B5EB527}"/>
               </a:ext>
             </a:extLst>
           </p:cNvPr>
@@ -4055,26 +4034,720 @@
             <p:ph idx="1"/>
           </p:nvPr>
         </p:nvPicPr>
-        <p:blipFill>
+        <p:blipFill rotWithShape="1">
           <a:blip r:embed="rId2"/>
-          <a:stretch>
-            <a:fillRect/>
-          </a:stretch>
+          <a:srcRect l="702" r="1279"/>
+          <a:stretch/>
         </p:blipFill>
         <p:spPr>
           <a:xfrm>
-            <a:off x="3454624" y="1558925"/>
-            <a:ext cx="5282751" cy="4351338"/>
+            <a:off x="1000126" y="1982856"/>
+            <a:ext cx="5019675" cy="3717235"/>
+          </a:xfrm>
+        </p:spPr>
+      </p:pic>
+      <p:sp>
+        <p:nvSpPr>
+          <p:cNvPr id="2" name="Titel 1">
+            <a:extLst>
+              <a:ext uri="{FF2B5EF4-FFF2-40B4-BE49-F238E27FC236}">
+                <a16:creationId xmlns:a16="http://schemas.microsoft.com/office/drawing/2014/main" id="{37711C6E-3723-31B3-5791-7B015790CFDA}"/>
+              </a:ext>
+            </a:extLst>
+          </p:cNvPr>
+          <p:cNvSpPr>
+            <a:spLocks noGrp="1"/>
+          </p:cNvSpPr>
+          <p:nvPr>
+            <p:ph type="title"/>
+          </p:nvPr>
+        </p:nvSpPr>
+        <p:spPr/>
+        <p:txBody>
+          <a:bodyPr/>
+          <a:lstStyle/>
+          <a:p>
+            <a:r>
+              <a:rPr lang="de-DE" dirty="0"/>
+              <a:t>EDA – </a:t>
+            </a:r>
+            <a:r>
+              <a:rPr lang="de-DE" dirty="0" err="1"/>
+              <a:t>word</a:t>
+            </a:r>
+            <a:r>
+              <a:rPr lang="de-DE" dirty="0"/>
+              <a:t> and </a:t>
+            </a:r>
+            <a:r>
+              <a:rPr lang="de-DE" dirty="0" err="1"/>
+              <a:t>character</a:t>
+            </a:r>
+            <a:r>
+              <a:rPr lang="de-DE" dirty="0"/>
+              <a:t> </a:t>
+            </a:r>
+            <a:r>
+              <a:rPr lang="de-DE" dirty="0" err="1"/>
+              <a:t>counts</a:t>
+            </a:r>
+            <a:endParaRPr lang="de-AT" dirty="0"/>
+          </a:p>
+        </p:txBody>
+      </p:sp>
+      <p:pic>
+        <p:nvPicPr>
+          <p:cNvPr id="5" name="Grafik 4">
+            <a:extLst>
+              <a:ext uri="{FF2B5EF4-FFF2-40B4-BE49-F238E27FC236}">
+                <a16:creationId xmlns:a16="http://schemas.microsoft.com/office/drawing/2014/main" id="{B857AB96-BD34-0F13-52FB-0081B5363DF9}"/>
+              </a:ext>
+            </a:extLst>
+          </p:cNvPr>
+          <p:cNvPicPr>
+            <a:picLocks noChangeAspect="1"/>
+          </p:cNvPicPr>
+          <p:nvPr/>
+        </p:nvPicPr>
+        <p:blipFill rotWithShape="1">
+          <a:blip r:embed="rId3"/>
+          <a:srcRect l="1053" t="1305" r="1219" b="1344"/>
+          <a:stretch/>
+        </p:blipFill>
+        <p:spPr>
+          <a:xfrm>
+            <a:off x="6631826" y="2095137"/>
+            <a:ext cx="5096347" cy="3570167"/>
           </a:xfrm>
           <a:prstGeom prst="rect">
             <a:avLst/>
           </a:prstGeom>
         </p:spPr>
       </p:pic>
+      <p:sp>
+        <p:nvSpPr>
+          <p:cNvPr id="8" name="Textfeld 7">
+            <a:extLst>
+              <a:ext uri="{FF2B5EF4-FFF2-40B4-BE49-F238E27FC236}">
+                <a16:creationId xmlns:a16="http://schemas.microsoft.com/office/drawing/2014/main" id="{EE2DB143-D89E-B7DA-075F-A6508FFECE31}"/>
+              </a:ext>
+            </a:extLst>
+          </p:cNvPr>
+          <p:cNvSpPr txBox="1"/>
+          <p:nvPr/>
+        </p:nvSpPr>
+        <p:spPr>
+          <a:xfrm>
+            <a:off x="8736495" y="5546927"/>
+            <a:ext cx="1461053" cy="307777"/>
+          </a:xfrm>
+          <a:prstGeom prst="rect">
+            <a:avLst/>
+          </a:prstGeom>
+          <a:noFill/>
+        </p:spPr>
+        <p:txBody>
+          <a:bodyPr wrap="square" rtlCol="0">
+            <a:spAutoFit/>
+          </a:bodyPr>
+          <a:lstStyle/>
+          <a:p>
+            <a:pPr algn="ctr"/>
+            <a:r>
+              <a:rPr lang="de-DE" sz="1400" dirty="0" err="1"/>
+              <a:t>character</a:t>
+            </a:r>
+            <a:r>
+              <a:rPr lang="de-DE" sz="1400" dirty="0"/>
+              <a:t> </a:t>
+            </a:r>
+            <a:r>
+              <a:rPr lang="de-DE" sz="1400" dirty="0" err="1"/>
+              <a:t>count</a:t>
+            </a:r>
+            <a:endParaRPr lang="de-AT" sz="1400" dirty="0"/>
+          </a:p>
+        </p:txBody>
+      </p:sp>
+      <p:sp>
+        <p:nvSpPr>
+          <p:cNvPr id="9" name="Textfeld 8">
+            <a:extLst>
+              <a:ext uri="{FF2B5EF4-FFF2-40B4-BE49-F238E27FC236}">
+                <a16:creationId xmlns:a16="http://schemas.microsoft.com/office/drawing/2014/main" id="{CAA22D78-4478-9820-7407-8F8CCDDD6C4D}"/>
+              </a:ext>
+            </a:extLst>
+          </p:cNvPr>
+          <p:cNvSpPr txBox="1"/>
+          <p:nvPr/>
+        </p:nvSpPr>
+        <p:spPr>
+          <a:xfrm>
+            <a:off x="2724979" y="5538048"/>
+            <a:ext cx="1461053" cy="307777"/>
+          </a:xfrm>
+          <a:prstGeom prst="rect">
+            <a:avLst/>
+          </a:prstGeom>
+          <a:noFill/>
+        </p:spPr>
+        <p:txBody>
+          <a:bodyPr wrap="square" rtlCol="0">
+            <a:spAutoFit/>
+          </a:bodyPr>
+          <a:lstStyle/>
+          <a:p>
+            <a:pPr algn="ctr"/>
+            <a:r>
+              <a:rPr lang="de-DE" sz="1400" dirty="0" err="1"/>
+              <a:t>word</a:t>
+            </a:r>
+            <a:r>
+              <a:rPr lang="de-DE" sz="1400" dirty="0"/>
+              <a:t> </a:t>
+            </a:r>
+            <a:r>
+              <a:rPr lang="de-DE" sz="1400" dirty="0" err="1"/>
+              <a:t>count</a:t>
+            </a:r>
+            <a:endParaRPr lang="de-AT" sz="1400" dirty="0"/>
+          </a:p>
+        </p:txBody>
+      </p:sp>
+      <p:sp>
+        <p:nvSpPr>
+          <p:cNvPr id="10" name="Textfeld 9">
+            <a:extLst>
+              <a:ext uri="{FF2B5EF4-FFF2-40B4-BE49-F238E27FC236}">
+                <a16:creationId xmlns:a16="http://schemas.microsoft.com/office/drawing/2014/main" id="{8F43450C-E456-055A-1D47-6DAE15D94294}"/>
+              </a:ext>
+            </a:extLst>
+          </p:cNvPr>
+          <p:cNvSpPr txBox="1"/>
+          <p:nvPr/>
+        </p:nvSpPr>
+        <p:spPr>
+          <a:xfrm rot="16200000">
+            <a:off x="-75295" y="3430945"/>
+            <a:ext cx="1843066" cy="307777"/>
+          </a:xfrm>
+          <a:prstGeom prst="rect">
+            <a:avLst/>
+          </a:prstGeom>
+          <a:noFill/>
+        </p:spPr>
+        <p:txBody>
+          <a:bodyPr wrap="square" rtlCol="0">
+            <a:spAutoFit/>
+          </a:bodyPr>
+          <a:lstStyle/>
+          <a:p>
+            <a:pPr algn="ctr"/>
+            <a:r>
+              <a:rPr lang="de-DE" sz="1400" dirty="0" err="1"/>
+              <a:t>number</a:t>
+            </a:r>
+            <a:r>
+              <a:rPr lang="de-DE" sz="1400" dirty="0"/>
+              <a:t> </a:t>
+            </a:r>
+            <a:r>
+              <a:rPr lang="de-DE" sz="1400" dirty="0" err="1"/>
+              <a:t>of</a:t>
+            </a:r>
+            <a:r>
+              <a:rPr lang="de-DE" sz="1400" dirty="0"/>
+              <a:t> </a:t>
+            </a:r>
+            <a:r>
+              <a:rPr lang="de-DE" sz="1400" dirty="0" err="1"/>
+              <a:t>movies</a:t>
+            </a:r>
+            <a:endParaRPr lang="de-AT" sz="1400" dirty="0"/>
+          </a:p>
+        </p:txBody>
+      </p:sp>
+      <p:sp>
+        <p:nvSpPr>
+          <p:cNvPr id="11" name="Textfeld 10">
+            <a:extLst>
+              <a:ext uri="{FF2B5EF4-FFF2-40B4-BE49-F238E27FC236}">
+                <a16:creationId xmlns:a16="http://schemas.microsoft.com/office/drawing/2014/main" id="{5D2329DE-4497-1171-EB0F-0C71E9B42DDD}"/>
+              </a:ext>
+            </a:extLst>
+          </p:cNvPr>
+          <p:cNvSpPr txBox="1"/>
+          <p:nvPr/>
+        </p:nvSpPr>
+        <p:spPr>
+          <a:xfrm rot="16200000">
+            <a:off x="5556405" y="3430945"/>
+            <a:ext cx="1843066" cy="307777"/>
+          </a:xfrm>
+          <a:prstGeom prst="rect">
+            <a:avLst/>
+          </a:prstGeom>
+          <a:noFill/>
+        </p:spPr>
+        <p:txBody>
+          <a:bodyPr wrap="square" rtlCol="0">
+            <a:spAutoFit/>
+          </a:bodyPr>
+          <a:lstStyle/>
+          <a:p>
+            <a:pPr algn="ctr"/>
+            <a:r>
+              <a:rPr lang="de-DE" sz="1400" dirty="0" err="1"/>
+              <a:t>number</a:t>
+            </a:r>
+            <a:r>
+              <a:rPr lang="de-DE" sz="1400" dirty="0"/>
+              <a:t> </a:t>
+            </a:r>
+            <a:r>
+              <a:rPr lang="de-DE" sz="1400" dirty="0" err="1"/>
+              <a:t>of</a:t>
+            </a:r>
+            <a:r>
+              <a:rPr lang="de-DE" sz="1400" dirty="0"/>
+              <a:t> </a:t>
+            </a:r>
+            <a:r>
+              <a:rPr lang="de-DE" sz="1400" dirty="0" err="1"/>
+              <a:t>movies</a:t>
+            </a:r>
+            <a:endParaRPr lang="de-AT" sz="1400" dirty="0"/>
+          </a:p>
+        </p:txBody>
+      </p:sp>
     </p:spTree>
     <p:extLst>
       <p:ext uri="{BB962C8B-B14F-4D97-AF65-F5344CB8AC3E}">
-        <p14:creationId xmlns:p14="http://schemas.microsoft.com/office/powerpoint/2010/main" val="3261292717"/>
+        <p14:creationId xmlns:p14="http://schemas.microsoft.com/office/powerpoint/2010/main" val="919498315"/>
+      </p:ext>
+    </p:extLst>
+  </p:cSld>
+  <p:clrMapOvr>
+    <a:masterClrMapping/>
+  </p:clrMapOvr>
+</p:sld>
+</file>
+
+<file path=ppt/slides/slide7.xml><?xml version="1.0" encoding="utf-8"?>
+<p:sld xmlns:a="http://schemas.openxmlformats.org/drawingml/2006/main" xmlns:r="http://schemas.openxmlformats.org/officeDocument/2006/relationships" xmlns:p="http://schemas.openxmlformats.org/presentationml/2006/main">
+  <p:cSld>
+    <p:spTree>
+      <p:nvGrpSpPr>
+        <p:cNvPr id="1" name=""/>
+        <p:cNvGrpSpPr/>
+        <p:nvPr/>
+      </p:nvGrpSpPr>
+      <p:grpSpPr>
+        <a:xfrm>
+          <a:off x="0" y="0"/>
+          <a:ext cx="0" cy="0"/>
+          <a:chOff x="0" y="0"/>
+          <a:chExt cx="0" cy="0"/>
+        </a:xfrm>
+      </p:grpSpPr>
+      <p:sp>
+        <p:nvSpPr>
+          <p:cNvPr id="2" name="Titel 1">
+            <a:extLst>
+              <a:ext uri="{FF2B5EF4-FFF2-40B4-BE49-F238E27FC236}">
+                <a16:creationId xmlns:a16="http://schemas.microsoft.com/office/drawing/2014/main" id="{C1351422-2233-95F4-B36C-C0519674B090}"/>
+              </a:ext>
+            </a:extLst>
+          </p:cNvPr>
+          <p:cNvSpPr>
+            <a:spLocks noGrp="1"/>
+          </p:cNvSpPr>
+          <p:nvPr>
+            <p:ph type="title"/>
+          </p:nvPr>
+        </p:nvSpPr>
+        <p:spPr/>
+        <p:txBody>
+          <a:bodyPr/>
+          <a:lstStyle/>
+          <a:p>
+            <a:r>
+              <a:rPr lang="de-DE" dirty="0"/>
+              <a:t>EDA - </a:t>
+            </a:r>
+            <a:r>
+              <a:rPr lang="de-DE" dirty="0" err="1"/>
+              <a:t>genres</a:t>
+            </a:r>
+            <a:endParaRPr lang="de-AT" dirty="0"/>
+          </a:p>
+        </p:txBody>
+      </p:sp>
+      <p:sp>
+        <p:nvSpPr>
+          <p:cNvPr id="3" name="Inhaltsplatzhalter 2">
+            <a:extLst>
+              <a:ext uri="{FF2B5EF4-FFF2-40B4-BE49-F238E27FC236}">
+                <a16:creationId xmlns:a16="http://schemas.microsoft.com/office/drawing/2014/main" id="{96162D03-183F-DE2F-D67B-577685F114D1}"/>
+              </a:ext>
+            </a:extLst>
+          </p:cNvPr>
+          <p:cNvSpPr>
+            <a:spLocks noGrp="1"/>
+          </p:cNvSpPr>
+          <p:nvPr>
+            <p:ph idx="1"/>
+          </p:nvPr>
+        </p:nvSpPr>
+        <p:spPr/>
+        <p:txBody>
+          <a:bodyPr/>
+          <a:lstStyle/>
+          <a:p>
+            <a:r>
+              <a:rPr lang="de-DE" dirty="0"/>
+              <a:t>Total </a:t>
+            </a:r>
+            <a:r>
+              <a:rPr lang="de-DE" dirty="0" err="1"/>
+              <a:t>number</a:t>
+            </a:r>
+            <a:r>
+              <a:rPr lang="de-DE" dirty="0"/>
+              <a:t> </a:t>
+            </a:r>
+            <a:r>
+              <a:rPr lang="de-DE" dirty="0" err="1"/>
+              <a:t>of</a:t>
+            </a:r>
+            <a:r>
+              <a:rPr lang="de-DE" dirty="0"/>
+              <a:t> 363 </a:t>
+            </a:r>
+            <a:r>
+              <a:rPr lang="de-DE" dirty="0" err="1"/>
+              <a:t>genres</a:t>
+            </a:r>
+            <a:endParaRPr lang="de-DE" dirty="0"/>
+          </a:p>
+          <a:p>
+            <a:r>
+              <a:rPr lang="de-AT" dirty="0" err="1"/>
+              <a:t>Each</a:t>
+            </a:r>
+            <a:r>
+              <a:rPr lang="de-AT" dirty="0"/>
+              <a:t> </a:t>
+            </a:r>
+            <a:r>
+              <a:rPr lang="de-AT" dirty="0" err="1"/>
+              <a:t>movie</a:t>
+            </a:r>
+            <a:r>
+              <a:rPr lang="de-AT" dirty="0"/>
+              <a:t> </a:t>
+            </a:r>
+            <a:r>
+              <a:rPr lang="de-AT" dirty="0" err="1"/>
+              <a:t>can</a:t>
+            </a:r>
+            <a:r>
+              <a:rPr lang="de-AT" dirty="0"/>
+              <a:t> </a:t>
+            </a:r>
+            <a:r>
+              <a:rPr lang="de-AT" dirty="0" err="1"/>
+              <a:t>have</a:t>
+            </a:r>
+            <a:r>
+              <a:rPr lang="de-AT" dirty="0"/>
+              <a:t> multiple </a:t>
+            </a:r>
+            <a:r>
+              <a:rPr lang="de-AT" dirty="0" err="1"/>
+              <a:t>genres</a:t>
+            </a:r>
+            <a:r>
+              <a:rPr lang="de-AT" dirty="0"/>
+              <a:t> </a:t>
+            </a:r>
+            <a:r>
+              <a:rPr lang="de-AT" dirty="0" err="1"/>
+              <a:t>assigned</a:t>
+            </a:r>
+            <a:endParaRPr lang="de-AT" dirty="0"/>
+          </a:p>
+          <a:p>
+            <a:pPr lvl="1"/>
+            <a:r>
+              <a:rPr lang="de-AT" dirty="0"/>
+              <a:t>Max. </a:t>
+            </a:r>
+            <a:r>
+              <a:rPr lang="de-AT" dirty="0" err="1"/>
+              <a:t>number</a:t>
+            </a:r>
+            <a:r>
+              <a:rPr lang="de-AT" dirty="0"/>
+              <a:t> </a:t>
+            </a:r>
+            <a:r>
+              <a:rPr lang="de-AT" dirty="0" err="1"/>
+              <a:t>of</a:t>
+            </a:r>
+            <a:r>
+              <a:rPr lang="de-AT" dirty="0"/>
+              <a:t> </a:t>
+            </a:r>
+            <a:r>
+              <a:rPr lang="de-AT" dirty="0" err="1"/>
+              <a:t>genres</a:t>
+            </a:r>
+            <a:r>
+              <a:rPr lang="de-AT" dirty="0"/>
+              <a:t> : 17</a:t>
+            </a:r>
+          </a:p>
+          <a:p>
+            <a:pPr lvl="1"/>
+            <a:r>
+              <a:rPr lang="de-AT" dirty="0"/>
+              <a:t>Min. </a:t>
+            </a:r>
+            <a:r>
+              <a:rPr lang="de-AT" dirty="0" err="1"/>
+              <a:t>number</a:t>
+            </a:r>
+            <a:r>
+              <a:rPr lang="de-AT" dirty="0"/>
+              <a:t> </a:t>
+            </a:r>
+            <a:r>
+              <a:rPr lang="de-AT" dirty="0" err="1"/>
+              <a:t>of</a:t>
+            </a:r>
+            <a:r>
+              <a:rPr lang="de-AT" dirty="0"/>
+              <a:t> </a:t>
+            </a:r>
+            <a:r>
+              <a:rPr lang="de-AT" dirty="0" err="1"/>
+              <a:t>genres</a:t>
+            </a:r>
+            <a:r>
+              <a:rPr lang="de-AT" dirty="0"/>
+              <a:t>: 0 -&gt; </a:t>
+            </a:r>
+            <a:r>
+              <a:rPr lang="de-AT" dirty="0" err="1"/>
+              <a:t>data</a:t>
+            </a:r>
+            <a:r>
+              <a:rPr lang="de-AT" dirty="0"/>
+              <a:t> </a:t>
+            </a:r>
+            <a:r>
+              <a:rPr lang="de-AT" dirty="0" err="1"/>
+              <a:t>cleaning</a:t>
+            </a:r>
+            <a:endParaRPr lang="de-AT" dirty="0"/>
+          </a:p>
+          <a:p>
+            <a:pPr lvl="1"/>
+            <a:r>
+              <a:rPr lang="de-AT" dirty="0"/>
+              <a:t>Average </a:t>
+            </a:r>
+            <a:r>
+              <a:rPr lang="de-AT" dirty="0" err="1"/>
+              <a:t>number</a:t>
+            </a:r>
+            <a:r>
+              <a:rPr lang="de-AT" dirty="0"/>
+              <a:t> </a:t>
+            </a:r>
+            <a:r>
+              <a:rPr lang="de-AT" dirty="0" err="1"/>
+              <a:t>of</a:t>
+            </a:r>
+            <a:r>
+              <a:rPr lang="de-AT" dirty="0"/>
+              <a:t> </a:t>
+            </a:r>
+            <a:r>
+              <a:rPr lang="de-AT" dirty="0" err="1"/>
+              <a:t>genres</a:t>
+            </a:r>
+            <a:r>
+              <a:rPr lang="de-AT" dirty="0"/>
+              <a:t>: 2.97</a:t>
+            </a:r>
+          </a:p>
+          <a:p>
+            <a:r>
+              <a:rPr lang="de-AT" dirty="0"/>
+              <a:t>10 </a:t>
+            </a:r>
+            <a:r>
+              <a:rPr lang="de-AT" dirty="0" err="1"/>
+              <a:t>most</a:t>
+            </a:r>
+            <a:r>
+              <a:rPr lang="de-AT" dirty="0"/>
+              <a:t> </a:t>
+            </a:r>
+            <a:r>
+              <a:rPr lang="de-AT" dirty="0" err="1"/>
+              <a:t>common</a:t>
+            </a:r>
+            <a:r>
+              <a:rPr lang="de-AT" dirty="0"/>
+              <a:t> </a:t>
+            </a:r>
+            <a:r>
+              <a:rPr lang="de-AT" dirty="0" err="1"/>
+              <a:t>genres</a:t>
+            </a:r>
+            <a:r>
+              <a:rPr lang="de-AT" dirty="0"/>
+              <a:t>:</a:t>
+            </a:r>
+          </a:p>
+          <a:p>
+            <a:endParaRPr lang="de-AT" dirty="0"/>
+          </a:p>
+        </p:txBody>
+      </p:sp>
+      <p:sp>
+        <p:nvSpPr>
+          <p:cNvPr id="4" name="Textfeld 3">
+            <a:extLst>
+              <a:ext uri="{FF2B5EF4-FFF2-40B4-BE49-F238E27FC236}">
+                <a16:creationId xmlns:a16="http://schemas.microsoft.com/office/drawing/2014/main" id="{75DF83DD-414D-C90D-5CE0-6A1A7A8BCC95}"/>
+              </a:ext>
+            </a:extLst>
+          </p:cNvPr>
+          <p:cNvSpPr txBox="1"/>
+          <p:nvPr/>
+        </p:nvSpPr>
+        <p:spPr>
+          <a:xfrm>
+            <a:off x="4882718" y="4001294"/>
+            <a:ext cx="3142695" cy="2246769"/>
+          </a:xfrm>
+          <a:prstGeom prst="rect">
+            <a:avLst/>
+          </a:prstGeom>
+          <a:noFill/>
+        </p:spPr>
+        <p:txBody>
+          <a:bodyPr wrap="square" rtlCol="0">
+            <a:spAutoFit/>
+          </a:bodyPr>
+          <a:lstStyle/>
+          <a:p>
+            <a:r>
+              <a:rPr lang="de-AT" sz="1400" b="0" i="0" dirty="0">
+                <a:effectLst/>
+                <a:latin typeface="Consolas" panose="020B0609020204030204" pitchFamily="49" charset="0"/>
+              </a:rPr>
+              <a:t>[('Drama', 34007), </a:t>
+            </a:r>
+          </a:p>
+          <a:p>
+            <a:r>
+              <a:rPr lang="de-AT" sz="1400" b="0" i="0" dirty="0">
+                <a:effectLst/>
+                <a:latin typeface="Consolas" panose="020B0609020204030204" pitchFamily="49" charset="0"/>
+              </a:rPr>
+              <a:t>('Comedy', 16349), </a:t>
+            </a:r>
+          </a:p>
+          <a:p>
+            <a:r>
+              <a:rPr lang="de-AT" sz="1400" b="0" i="0" dirty="0">
+                <a:effectLst/>
+                <a:latin typeface="Consolas" panose="020B0609020204030204" pitchFamily="49" charset="0"/>
+              </a:rPr>
+              <a:t>('</a:t>
+            </a:r>
+            <a:r>
+              <a:rPr lang="de-AT" sz="1400" b="0" i="0" dirty="0" err="1">
+                <a:effectLst/>
+                <a:latin typeface="Consolas" panose="020B0609020204030204" pitchFamily="49" charset="0"/>
+              </a:rPr>
+              <a:t>Romance</a:t>
+            </a:r>
+            <a:r>
+              <a:rPr lang="de-AT" sz="1400" b="0" i="0" dirty="0">
+                <a:effectLst/>
+                <a:latin typeface="Consolas" panose="020B0609020204030204" pitchFamily="49" charset="0"/>
+              </a:rPr>
+              <a:t> Film', 10234), ('Black-and-</a:t>
+            </a:r>
+            <a:r>
+              <a:rPr lang="de-AT" sz="1400" b="0" i="0" dirty="0" err="1">
+                <a:effectLst/>
+                <a:latin typeface="Consolas" panose="020B0609020204030204" pitchFamily="49" charset="0"/>
+              </a:rPr>
+              <a:t>white</a:t>
+            </a:r>
+            <a:r>
+              <a:rPr lang="de-AT" sz="1400" b="0" i="0" dirty="0">
+                <a:effectLst/>
+                <a:latin typeface="Consolas" panose="020B0609020204030204" pitchFamily="49" charset="0"/>
+              </a:rPr>
+              <a:t>', 9094), ('Action', 8798), </a:t>
+            </a:r>
+          </a:p>
+          <a:p>
+            <a:r>
+              <a:rPr lang="de-AT" sz="1400" b="0" i="0" dirty="0">
+                <a:effectLst/>
+                <a:latin typeface="Consolas" panose="020B0609020204030204" pitchFamily="49" charset="0"/>
+              </a:rPr>
+              <a:t>('Thriller', 8744), </a:t>
+            </a:r>
+          </a:p>
+          <a:p>
+            <a:r>
+              <a:rPr lang="de-AT" sz="1400" b="0" i="0" dirty="0">
+                <a:effectLst/>
+                <a:latin typeface="Consolas" panose="020B0609020204030204" pitchFamily="49" charset="0"/>
+              </a:rPr>
+              <a:t>('Short Film', 8141), </a:t>
+            </a:r>
+          </a:p>
+          <a:p>
+            <a:r>
+              <a:rPr lang="de-AT" sz="1400" b="0" i="0" dirty="0">
+                <a:effectLst/>
+                <a:latin typeface="Consolas" panose="020B0609020204030204" pitchFamily="49" charset="0"/>
+              </a:rPr>
+              <a:t>('World </a:t>
+            </a:r>
+            <a:r>
+              <a:rPr lang="de-AT" sz="1400" b="0" i="0" dirty="0" err="1">
+                <a:effectLst/>
+                <a:latin typeface="Consolas" panose="020B0609020204030204" pitchFamily="49" charset="0"/>
+              </a:rPr>
+              <a:t>cinema</a:t>
+            </a:r>
+            <a:r>
+              <a:rPr lang="de-AT" sz="1400" b="0" i="0" dirty="0">
+                <a:effectLst/>
+                <a:latin typeface="Consolas" panose="020B0609020204030204" pitchFamily="49" charset="0"/>
+              </a:rPr>
+              <a:t>', 7155), ('Crime Fiction', 6948), ('Indie', 6897)]</a:t>
+            </a:r>
+            <a:endParaRPr lang="de-AT" sz="1400" dirty="0"/>
+          </a:p>
+        </p:txBody>
+      </p:sp>
+    </p:spTree>
+    <p:extLst>
+      <p:ext uri="{BB962C8B-B14F-4D97-AF65-F5344CB8AC3E}">
+        <p14:creationId xmlns:p14="http://schemas.microsoft.com/office/powerpoint/2010/main" val="649034944"/>
       </p:ext>
     </p:extLst>
   </p:cSld>

</xml_diff>

<commit_message>
ebmedding with sbert added
</commit_message>
<xml_diff>
--- a/Presentations/session2.pptx
+++ b/Presentations/session2.pptx
@@ -5,7 +5,7 @@
     <p:sldMasterId id="2147483648" r:id="rId1"/>
   </p:sldMasterIdLst>
   <p:notesMasterIdLst>
-    <p:notesMasterId r:id="rId9"/>
+    <p:notesMasterId r:id="rId12"/>
   </p:notesMasterIdLst>
   <p:sldIdLst>
     <p:sldId id="256" r:id="rId2"/>
@@ -15,6 +15,9 @@
     <p:sldId id="260" r:id="rId6"/>
     <p:sldId id="262" r:id="rId7"/>
     <p:sldId id="263" r:id="rId8"/>
+    <p:sldId id="266" r:id="rId9"/>
+    <p:sldId id="265" r:id="rId10"/>
+    <p:sldId id="264" r:id="rId11"/>
   </p:sldIdLst>
   <p:sldSz cx="12192000" cy="6858000"/>
   <p:notesSz cx="6858000" cy="9144000"/>
@@ -203,7 +206,7 @@
           <a:p>
             <a:fld id="{2F91C706-E70F-46EA-8710-ED14C8B4D1F4}" type="datetimeFigureOut">
               <a:rPr lang="de-AT" smtClean="0"/>
-              <a:t>28.09.2023</a:t>
+              <a:t>05.10.2023</a:t>
             </a:fld>
             <a:endParaRPr lang="de-AT"/>
           </a:p>
@@ -362,7 +365,7 @@
           <a:p>
             <a:fld id="{83F8E09D-390F-429E-A5B6-742AD7102889}" type="slidenum">
               <a:rPr lang="de-AT" smtClean="0"/>
-              <a:t>‹Nr.›</a:t>
+              <a:t>‹#›</a:t>
             </a:fld>
             <a:endParaRPr lang="de-AT"/>
           </a:p>
@@ -707,7 +710,7 @@
           <a:p>
             <a:fld id="{FDFC82F5-4BEC-4C6D-AC7E-0EBE1A7D0913}" type="datetimeFigureOut">
               <a:rPr lang="en-GB" smtClean="0"/>
-              <a:t>28/09/2023</a:t>
+              <a:t>05/10/2023</a:t>
             </a:fld>
             <a:endParaRPr lang="en-GB"/>
           </a:p>
@@ -749,7 +752,7 @@
           <a:p>
             <a:fld id="{E935CC27-B294-42F1-A53F-8B1BF24D38A0}" type="slidenum">
               <a:rPr lang="en-GB" smtClean="0"/>
-              <a:t>‹Nr.›</a:t>
+              <a:t>‹#›</a:t>
             </a:fld>
             <a:endParaRPr lang="en-GB"/>
           </a:p>
@@ -887,7 +890,7 @@
           <a:p>
             <a:fld id="{FDFC82F5-4BEC-4C6D-AC7E-0EBE1A7D0913}" type="datetimeFigureOut">
               <a:rPr lang="en-GB" smtClean="0"/>
-              <a:t>28/09/2023</a:t>
+              <a:t>05/10/2023</a:t>
             </a:fld>
             <a:endParaRPr lang="en-GB"/>
           </a:p>
@@ -929,7 +932,7 @@
           <a:p>
             <a:fld id="{E935CC27-B294-42F1-A53F-8B1BF24D38A0}" type="slidenum">
               <a:rPr lang="en-GB" smtClean="0"/>
-              <a:t>‹Nr.›</a:t>
+              <a:t>‹#›</a:t>
             </a:fld>
             <a:endParaRPr lang="en-GB"/>
           </a:p>
@@ -1057,7 +1060,7 @@
           <a:p>
             <a:fld id="{FDFC82F5-4BEC-4C6D-AC7E-0EBE1A7D0913}" type="datetimeFigureOut">
               <a:rPr lang="en-GB" smtClean="0"/>
-              <a:t>28/09/2023</a:t>
+              <a:t>05/10/2023</a:t>
             </a:fld>
             <a:endParaRPr lang="en-GB"/>
           </a:p>
@@ -1099,7 +1102,7 @@
           <a:p>
             <a:fld id="{E935CC27-B294-42F1-A53F-8B1BF24D38A0}" type="slidenum">
               <a:rPr lang="en-GB" smtClean="0"/>
-              <a:t>‹Nr.›</a:t>
+              <a:t>‹#›</a:t>
             </a:fld>
             <a:endParaRPr lang="en-GB"/>
           </a:p>
@@ -1303,7 +1306,7 @@
           <a:p>
             <a:fld id="{FDFC82F5-4BEC-4C6D-AC7E-0EBE1A7D0913}" type="datetimeFigureOut">
               <a:rPr lang="en-GB" smtClean="0"/>
-              <a:t>28/09/2023</a:t>
+              <a:t>05/10/2023</a:t>
             </a:fld>
             <a:endParaRPr lang="en-GB"/>
           </a:p>
@@ -1345,7 +1348,7 @@
           <a:p>
             <a:fld id="{E935CC27-B294-42F1-A53F-8B1BF24D38A0}" type="slidenum">
               <a:rPr lang="en-GB" smtClean="0"/>
-              <a:t>‹Nr.›</a:t>
+              <a:t>‹#›</a:t>
             </a:fld>
             <a:endParaRPr lang="en-GB"/>
           </a:p>
@@ -1535,7 +1538,7 @@
           <a:p>
             <a:fld id="{FDFC82F5-4BEC-4C6D-AC7E-0EBE1A7D0913}" type="datetimeFigureOut">
               <a:rPr lang="en-GB" smtClean="0"/>
-              <a:t>28/09/2023</a:t>
+              <a:t>05/10/2023</a:t>
             </a:fld>
             <a:endParaRPr lang="en-GB"/>
           </a:p>
@@ -1577,7 +1580,7 @@
           <a:p>
             <a:fld id="{E935CC27-B294-42F1-A53F-8B1BF24D38A0}" type="slidenum">
               <a:rPr lang="en-GB" smtClean="0"/>
-              <a:t>‹Nr.›</a:t>
+              <a:t>‹#›</a:t>
             </a:fld>
             <a:endParaRPr lang="en-GB"/>
           </a:p>
@@ -1902,7 +1905,7 @@
           <a:p>
             <a:fld id="{FDFC82F5-4BEC-4C6D-AC7E-0EBE1A7D0913}" type="datetimeFigureOut">
               <a:rPr lang="en-GB" smtClean="0"/>
-              <a:t>28/09/2023</a:t>
+              <a:t>05/10/2023</a:t>
             </a:fld>
             <a:endParaRPr lang="en-GB"/>
           </a:p>
@@ -1944,7 +1947,7 @@
           <a:p>
             <a:fld id="{E935CC27-B294-42F1-A53F-8B1BF24D38A0}" type="slidenum">
               <a:rPr lang="en-GB" smtClean="0"/>
-              <a:t>‹Nr.›</a:t>
+              <a:t>‹#›</a:t>
             </a:fld>
             <a:endParaRPr lang="en-GB"/>
           </a:p>
@@ -2020,7 +2023,7 @@
           <a:p>
             <a:fld id="{FDFC82F5-4BEC-4C6D-AC7E-0EBE1A7D0913}" type="datetimeFigureOut">
               <a:rPr lang="en-GB" smtClean="0"/>
-              <a:t>28/09/2023</a:t>
+              <a:t>05/10/2023</a:t>
             </a:fld>
             <a:endParaRPr lang="en-GB"/>
           </a:p>
@@ -2062,7 +2065,7 @@
           <a:p>
             <a:fld id="{E935CC27-B294-42F1-A53F-8B1BF24D38A0}" type="slidenum">
               <a:rPr lang="en-GB" smtClean="0"/>
-              <a:t>‹Nr.›</a:t>
+              <a:t>‹#›</a:t>
             </a:fld>
             <a:endParaRPr lang="en-GB"/>
           </a:p>
@@ -2115,7 +2118,7 @@
           <a:p>
             <a:fld id="{FDFC82F5-4BEC-4C6D-AC7E-0EBE1A7D0913}" type="datetimeFigureOut">
               <a:rPr lang="en-GB" smtClean="0"/>
-              <a:t>28/09/2023</a:t>
+              <a:t>05/10/2023</a:t>
             </a:fld>
             <a:endParaRPr lang="en-GB"/>
           </a:p>
@@ -2157,7 +2160,7 @@
           <a:p>
             <a:fld id="{E935CC27-B294-42F1-A53F-8B1BF24D38A0}" type="slidenum">
               <a:rPr lang="en-GB" smtClean="0"/>
-              <a:t>‹Nr.›</a:t>
+              <a:t>‹#›</a:t>
             </a:fld>
             <a:endParaRPr lang="en-GB"/>
           </a:p>
@@ -2392,7 +2395,7 @@
           <a:p>
             <a:fld id="{FDFC82F5-4BEC-4C6D-AC7E-0EBE1A7D0913}" type="datetimeFigureOut">
               <a:rPr lang="en-GB" smtClean="0"/>
-              <a:t>28/09/2023</a:t>
+              <a:t>05/10/2023</a:t>
             </a:fld>
             <a:endParaRPr lang="en-GB"/>
           </a:p>
@@ -2434,7 +2437,7 @@
           <a:p>
             <a:fld id="{E935CC27-B294-42F1-A53F-8B1BF24D38A0}" type="slidenum">
               <a:rPr lang="en-GB" smtClean="0"/>
-              <a:t>‹Nr.›</a:t>
+              <a:t>‹#›</a:t>
             </a:fld>
             <a:endParaRPr lang="en-GB"/>
           </a:p>
@@ -2645,7 +2648,7 @@
           <a:p>
             <a:fld id="{FDFC82F5-4BEC-4C6D-AC7E-0EBE1A7D0913}" type="datetimeFigureOut">
               <a:rPr lang="en-GB" smtClean="0"/>
-              <a:t>28/09/2023</a:t>
+              <a:t>05/10/2023</a:t>
             </a:fld>
             <a:endParaRPr lang="en-GB"/>
           </a:p>
@@ -2687,7 +2690,7 @@
           <a:p>
             <a:fld id="{E935CC27-B294-42F1-A53F-8B1BF24D38A0}" type="slidenum">
               <a:rPr lang="en-GB" smtClean="0"/>
-              <a:t>‹Nr.›</a:t>
+              <a:t>‹#›</a:t>
             </a:fld>
             <a:endParaRPr lang="en-GB"/>
           </a:p>
@@ -2858,7 +2861,7 @@
           <a:p>
             <a:fld id="{FDFC82F5-4BEC-4C6D-AC7E-0EBE1A7D0913}" type="datetimeFigureOut">
               <a:rPr lang="en-GB" smtClean="0"/>
-              <a:t>28/09/2023</a:t>
+              <a:t>05/10/2023</a:t>
             </a:fld>
             <a:endParaRPr lang="en-GB"/>
           </a:p>
@@ -2936,7 +2939,7 @@
           <a:p>
             <a:fld id="{E935CC27-B294-42F1-A53F-8B1BF24D38A0}" type="slidenum">
               <a:rPr lang="en-GB" smtClean="0"/>
-              <a:t>‹Nr.›</a:t>
+              <a:t>‹#›</a:t>
             </a:fld>
             <a:endParaRPr lang="en-GB"/>
           </a:p>
@@ -3400,6 +3403,234 @@
 </p:sld>
 </file>
 
+<file path=ppt/slides/slide10.xml><?xml version="1.0" encoding="utf-8"?>
+<p:sld xmlns:a="http://schemas.openxmlformats.org/drawingml/2006/main" xmlns:r="http://schemas.openxmlformats.org/officeDocument/2006/relationships" xmlns:p="http://schemas.openxmlformats.org/presentationml/2006/main">
+  <p:cSld>
+    <p:spTree>
+      <p:nvGrpSpPr>
+        <p:cNvPr id="1" name=""/>
+        <p:cNvGrpSpPr/>
+        <p:nvPr/>
+      </p:nvGrpSpPr>
+      <p:grpSpPr>
+        <a:xfrm>
+          <a:off x="0" y="0"/>
+          <a:ext cx="0" cy="0"/>
+          <a:chOff x="0" y="0"/>
+          <a:chExt cx="0" cy="0"/>
+        </a:xfrm>
+      </p:grpSpPr>
+      <p:sp>
+        <p:nvSpPr>
+          <p:cNvPr id="2" name="Title 1">
+            <a:extLst>
+              <a:ext uri="{FF2B5EF4-FFF2-40B4-BE49-F238E27FC236}">
+                <a16:creationId xmlns:a16="http://schemas.microsoft.com/office/drawing/2014/main" id="{50988371-E551-FEA1-3410-060E034BBCE4}"/>
+              </a:ext>
+            </a:extLst>
+          </p:cNvPr>
+          <p:cNvSpPr>
+            <a:spLocks noGrp="1"/>
+          </p:cNvSpPr>
+          <p:nvPr>
+            <p:ph type="title"/>
+          </p:nvPr>
+        </p:nvSpPr>
+        <p:spPr/>
+        <p:txBody>
+          <a:bodyPr/>
+          <a:lstStyle/>
+          <a:p>
+            <a:r>
+              <a:rPr lang="de-DE" dirty="0"/>
+              <a:t>Reducing number of Categories</a:t>
+            </a:r>
+            <a:endParaRPr lang="de-AT" dirty="0"/>
+          </a:p>
+        </p:txBody>
+      </p:sp>
+      <p:pic>
+        <p:nvPicPr>
+          <p:cNvPr id="5" name="Content Placeholder 4">
+            <a:extLst>
+              <a:ext uri="{FF2B5EF4-FFF2-40B4-BE49-F238E27FC236}">
+                <a16:creationId xmlns:a16="http://schemas.microsoft.com/office/drawing/2014/main" id="{CB42745B-150A-A597-89EA-3DE0CA749D67}"/>
+              </a:ext>
+            </a:extLst>
+          </p:cNvPr>
+          <p:cNvPicPr>
+            <a:picLocks noGrp="1" noChangeAspect="1"/>
+          </p:cNvPicPr>
+          <p:nvPr>
+            <p:ph idx="1"/>
+          </p:nvPr>
+        </p:nvPicPr>
+        <p:blipFill>
+          <a:blip r:embed="rId2"/>
+          <a:stretch>
+            <a:fillRect/>
+          </a:stretch>
+        </p:blipFill>
+        <p:spPr>
+          <a:xfrm>
+            <a:off x="5172783" y="1839375"/>
+            <a:ext cx="6315306" cy="4351338"/>
+          </a:xfrm>
+        </p:spPr>
+      </p:pic>
+      <p:sp>
+        <p:nvSpPr>
+          <p:cNvPr id="6" name="TextBox 5">
+            <a:extLst>
+              <a:ext uri="{FF2B5EF4-FFF2-40B4-BE49-F238E27FC236}">
+                <a16:creationId xmlns:a16="http://schemas.microsoft.com/office/drawing/2014/main" id="{631C456B-6209-2395-A2A5-4BDBAE104F08}"/>
+              </a:ext>
+            </a:extLst>
+          </p:cNvPr>
+          <p:cNvSpPr txBox="1"/>
+          <p:nvPr/>
+        </p:nvSpPr>
+        <p:spPr>
+          <a:xfrm>
+            <a:off x="838200" y="1930210"/>
+            <a:ext cx="3781353" cy="3416320"/>
+          </a:xfrm>
+          <a:prstGeom prst="rect">
+            <a:avLst/>
+          </a:prstGeom>
+          <a:noFill/>
+        </p:spPr>
+        <p:txBody>
+          <a:bodyPr wrap="square" rtlCol="0">
+            <a:spAutoFit/>
+          </a:bodyPr>
+          <a:lstStyle/>
+          <a:p>
+            <a:r>
+              <a:rPr lang="en-US" b="0" dirty="0" err="1">
+                <a:solidFill>
+                  <a:srgbClr val="6A9955"/>
+                </a:solidFill>
+                <a:effectLst/>
+                <a:latin typeface="Consolas" panose="020B0609020204030204" pitchFamily="49" charset="0"/>
+              </a:rPr>
+              <a:t>SciKit</a:t>
+            </a:r>
+            <a:r>
+              <a:rPr lang="en-US" b="0" dirty="0">
+                <a:solidFill>
+                  <a:srgbClr val="6A9955"/>
+                </a:solidFill>
+                <a:effectLst/>
+                <a:latin typeface="Consolas" panose="020B0609020204030204" pitchFamily="49" charset="0"/>
+              </a:rPr>
+              <a:t> - TF-IDF (Term Frequency-Inverse Document Frequency)</a:t>
+            </a:r>
+          </a:p>
+          <a:p>
+            <a:endParaRPr lang="en-US" dirty="0">
+              <a:solidFill>
+                <a:srgbClr val="6A9955"/>
+              </a:solidFill>
+              <a:latin typeface="Consolas" panose="020B0609020204030204" pitchFamily="49" charset="0"/>
+            </a:endParaRPr>
+          </a:p>
+          <a:p>
+            <a:endParaRPr lang="en-US" b="0" dirty="0">
+              <a:solidFill>
+                <a:srgbClr val="6A9955"/>
+              </a:solidFill>
+              <a:effectLst/>
+              <a:latin typeface="Consolas" panose="020B0609020204030204" pitchFamily="49" charset="0"/>
+            </a:endParaRPr>
+          </a:p>
+          <a:p>
+            <a:r>
+              <a:rPr lang="en-US" dirty="0">
+                <a:solidFill>
+                  <a:srgbClr val="6A9955"/>
+                </a:solidFill>
+                <a:latin typeface="Consolas" panose="020B0609020204030204" pitchFamily="49" charset="0"/>
+              </a:rPr>
+              <a:t>or</a:t>
+            </a:r>
+            <a:endParaRPr lang="en-US" b="0" dirty="0">
+              <a:solidFill>
+                <a:srgbClr val="6A9955"/>
+              </a:solidFill>
+              <a:effectLst/>
+              <a:latin typeface="Consolas" panose="020B0609020204030204" pitchFamily="49" charset="0"/>
+            </a:endParaRPr>
+          </a:p>
+          <a:p>
+            <a:endParaRPr lang="en-US" dirty="0">
+              <a:solidFill>
+                <a:srgbClr val="6A9955"/>
+              </a:solidFill>
+              <a:latin typeface="Consolas" panose="020B0609020204030204" pitchFamily="49" charset="0"/>
+            </a:endParaRPr>
+          </a:p>
+          <a:p>
+            <a:r>
+              <a:rPr lang="de-AT" b="0" dirty="0">
+                <a:solidFill>
+                  <a:srgbClr val="6A9955"/>
+                </a:solidFill>
+                <a:effectLst/>
+                <a:latin typeface="Consolas" panose="020B0609020204030204" pitchFamily="49" charset="0"/>
+              </a:rPr>
+              <a:t>gensim.models import Word2Vec</a:t>
+            </a:r>
+            <a:endParaRPr lang="de-AT" b="0" dirty="0">
+              <a:solidFill>
+                <a:srgbClr val="CCCCCC"/>
+              </a:solidFill>
+              <a:effectLst/>
+              <a:latin typeface="Consolas" panose="020B0609020204030204" pitchFamily="49" charset="0"/>
+            </a:endParaRPr>
+          </a:p>
+          <a:p>
+            <a:endParaRPr lang="en-US" dirty="0">
+              <a:solidFill>
+                <a:srgbClr val="6A9955"/>
+              </a:solidFill>
+              <a:latin typeface="Consolas" panose="020B0609020204030204" pitchFamily="49" charset="0"/>
+            </a:endParaRPr>
+          </a:p>
+          <a:p>
+            <a:r>
+              <a:rPr lang="en-US" dirty="0">
+                <a:solidFill>
+                  <a:srgbClr val="6A9955"/>
+                </a:solidFill>
+                <a:latin typeface="Consolas" panose="020B0609020204030204" pitchFamily="49" charset="0"/>
+              </a:rPr>
+              <a:t>-&gt; K-means</a:t>
+            </a:r>
+          </a:p>
+          <a:p>
+            <a:endParaRPr lang="en-US" dirty="0">
+              <a:solidFill>
+                <a:srgbClr val="6A9955"/>
+              </a:solidFill>
+              <a:latin typeface="Consolas" panose="020B0609020204030204" pitchFamily="49" charset="0"/>
+            </a:endParaRPr>
+          </a:p>
+        </p:txBody>
+      </p:sp>
+    </p:spTree>
+    <p:extLst>
+      <p:ext uri="{BB962C8B-B14F-4D97-AF65-F5344CB8AC3E}">
+        <p14:creationId xmlns:p14="http://schemas.microsoft.com/office/powerpoint/2010/main" val="1694371208"/>
+      </p:ext>
+    </p:extLst>
+  </p:cSld>
+  <p:clrMapOvr>
+    <a:masterClrMapping/>
+  </p:clrMapOvr>
+</p:sld>
+</file>
+
 <file path=ppt/slides/slide2.xml><?xml version="1.0" encoding="utf-8"?>
 <p:sld xmlns:a="http://schemas.openxmlformats.org/drawingml/2006/main" xmlns:r="http://schemas.openxmlformats.org/officeDocument/2006/relationships" xmlns:p="http://schemas.openxmlformats.org/presentationml/2006/main">
   <p:cSld>
@@ -4756,6 +4987,182 @@
     <p:extLst>
       <p:ext uri="{BB962C8B-B14F-4D97-AF65-F5344CB8AC3E}">
         <p14:creationId xmlns:p14="http://schemas.microsoft.com/office/powerpoint/2010/main" val="649034944"/>
+      </p:ext>
+    </p:extLst>
+  </p:cSld>
+  <p:clrMapOvr>
+    <a:masterClrMapping/>
+  </p:clrMapOvr>
+</p:sld>
+</file>
+
+<file path=ppt/slides/slide8.xml><?xml version="1.0" encoding="utf-8"?>
+<p:sld xmlns:a="http://schemas.openxmlformats.org/drawingml/2006/main" xmlns:r="http://schemas.openxmlformats.org/officeDocument/2006/relationships" xmlns:p="http://schemas.openxmlformats.org/presentationml/2006/main">
+  <p:cSld>
+    <p:spTree>
+      <p:nvGrpSpPr>
+        <p:cNvPr id="1" name=""/>
+        <p:cNvGrpSpPr/>
+        <p:nvPr/>
+      </p:nvGrpSpPr>
+      <p:grpSpPr>
+        <a:xfrm>
+          <a:off x="0" y="0"/>
+          <a:ext cx="0" cy="0"/>
+          <a:chOff x="0" y="0"/>
+          <a:chExt cx="0" cy="0"/>
+        </a:xfrm>
+      </p:grpSpPr>
+      <p:sp>
+        <p:nvSpPr>
+          <p:cNvPr id="2" name="Title 1">
+            <a:extLst>
+              <a:ext uri="{FF2B5EF4-FFF2-40B4-BE49-F238E27FC236}">
+                <a16:creationId xmlns:a16="http://schemas.microsoft.com/office/drawing/2014/main" id="{15AB2C19-8076-6376-1263-3E219CDB26D9}"/>
+              </a:ext>
+            </a:extLst>
+          </p:cNvPr>
+          <p:cNvSpPr>
+            <a:spLocks noGrp="1"/>
+          </p:cNvSpPr>
+          <p:nvPr>
+            <p:ph type="title"/>
+          </p:nvPr>
+        </p:nvSpPr>
+        <p:spPr/>
+        <p:txBody>
+          <a:bodyPr/>
+          <a:lstStyle/>
+          <a:p>
+            <a:r>
+              <a:rPr lang="de-DE" dirty="0"/>
+              <a:t>Balance of the 356 Genres</a:t>
+            </a:r>
+            <a:endParaRPr lang="de-AT" dirty="0"/>
+          </a:p>
+        </p:txBody>
+      </p:sp>
+      <p:pic>
+        <p:nvPicPr>
+          <p:cNvPr id="5" name="Content Placeholder 4">
+            <a:extLst>
+              <a:ext uri="{FF2B5EF4-FFF2-40B4-BE49-F238E27FC236}">
+                <a16:creationId xmlns:a16="http://schemas.microsoft.com/office/drawing/2014/main" id="{C531C4BC-9184-AE72-0A34-272D0892820B}"/>
+              </a:ext>
+            </a:extLst>
+          </p:cNvPr>
+          <p:cNvPicPr>
+            <a:picLocks noGrp="1" noChangeAspect="1"/>
+          </p:cNvPicPr>
+          <p:nvPr>
+            <p:ph idx="1"/>
+          </p:nvPr>
+        </p:nvPicPr>
+        <p:blipFill>
+          <a:blip r:embed="rId2"/>
+          <a:stretch>
+            <a:fillRect/>
+          </a:stretch>
+        </p:blipFill>
+        <p:spPr>
+          <a:xfrm>
+            <a:off x="1251285" y="1832500"/>
+            <a:ext cx="9463816" cy="4351338"/>
+          </a:xfrm>
+        </p:spPr>
+      </p:pic>
+    </p:spTree>
+    <p:extLst>
+      <p:ext uri="{BB962C8B-B14F-4D97-AF65-F5344CB8AC3E}">
+        <p14:creationId xmlns:p14="http://schemas.microsoft.com/office/powerpoint/2010/main" val="2059261804"/>
+      </p:ext>
+    </p:extLst>
+  </p:cSld>
+  <p:clrMapOvr>
+    <a:masterClrMapping/>
+  </p:clrMapOvr>
+</p:sld>
+</file>
+
+<file path=ppt/slides/slide9.xml><?xml version="1.0" encoding="utf-8"?>
+<p:sld xmlns:a="http://schemas.openxmlformats.org/drawingml/2006/main" xmlns:r="http://schemas.openxmlformats.org/officeDocument/2006/relationships" xmlns:p="http://schemas.openxmlformats.org/presentationml/2006/main">
+  <p:cSld>
+    <p:spTree>
+      <p:nvGrpSpPr>
+        <p:cNvPr id="1" name=""/>
+        <p:cNvGrpSpPr/>
+        <p:nvPr/>
+      </p:nvGrpSpPr>
+      <p:grpSpPr>
+        <a:xfrm>
+          <a:off x="0" y="0"/>
+          <a:ext cx="0" cy="0"/>
+          <a:chOff x="0" y="0"/>
+          <a:chExt cx="0" cy="0"/>
+        </a:xfrm>
+      </p:grpSpPr>
+      <p:sp>
+        <p:nvSpPr>
+          <p:cNvPr id="2" name="Title 1">
+            <a:extLst>
+              <a:ext uri="{FF2B5EF4-FFF2-40B4-BE49-F238E27FC236}">
+                <a16:creationId xmlns:a16="http://schemas.microsoft.com/office/drawing/2014/main" id="{681101CF-2D17-27E7-2122-0CB778244828}"/>
+              </a:ext>
+            </a:extLst>
+          </p:cNvPr>
+          <p:cNvSpPr>
+            <a:spLocks noGrp="1"/>
+          </p:cNvSpPr>
+          <p:nvPr>
+            <p:ph type="title"/>
+          </p:nvPr>
+        </p:nvSpPr>
+        <p:spPr/>
+        <p:txBody>
+          <a:bodyPr/>
+          <a:lstStyle/>
+          <a:p>
+            <a:r>
+              <a:rPr lang="de-DE" dirty="0"/>
+              <a:t>Coocurence Matrix for Genres</a:t>
+            </a:r>
+            <a:endParaRPr lang="de-AT" dirty="0"/>
+          </a:p>
+        </p:txBody>
+      </p:sp>
+      <p:pic>
+        <p:nvPicPr>
+          <p:cNvPr id="5" name="Content Placeholder 4">
+            <a:extLst>
+              <a:ext uri="{FF2B5EF4-FFF2-40B4-BE49-F238E27FC236}">
+                <a16:creationId xmlns:a16="http://schemas.microsoft.com/office/drawing/2014/main" id="{E1E43038-3DB8-6C14-F52D-8734F807DA37}"/>
+              </a:ext>
+            </a:extLst>
+          </p:cNvPr>
+          <p:cNvPicPr>
+            <a:picLocks noGrp="1" noChangeAspect="1"/>
+          </p:cNvPicPr>
+          <p:nvPr>
+            <p:ph idx="1"/>
+          </p:nvPr>
+        </p:nvPicPr>
+        <p:blipFill>
+          <a:blip r:embed="rId2"/>
+          <a:stretch>
+            <a:fillRect/>
+          </a:stretch>
+        </p:blipFill>
+        <p:spPr>
+          <a:xfrm>
+            <a:off x="3261321" y="1825625"/>
+            <a:ext cx="5669358" cy="4351338"/>
+          </a:xfrm>
+        </p:spPr>
+      </p:pic>
+    </p:spTree>
+    <p:extLst>
+      <p:ext uri="{BB962C8B-B14F-4D97-AF65-F5344CB8AC3E}">
+        <p14:creationId xmlns:p14="http://schemas.microsoft.com/office/powerpoint/2010/main" val="2065039316"/>
       </p:ext>
     </p:extLst>
   </p:cSld>

</xml_diff>